<commit_message>
Redo of Design PPT
</commit_message>
<xml_diff>
--- a/documents/design1.pptx
+++ b/documents/design1.pptx
@@ -129,25 +129,39 @@
   </mc:AlternateContent>
   <c:chart>
     <c:title>
+      <c:tx>
+        <c:rich>
+          <a:bodyPr/>
+          <a:lstStyle/>
+          <a:p>
+            <a:pPr>
+              <a:defRPr sz="2000">
+                <a:latin typeface="Gill Sans MT" panose="020B0502020104020203" pitchFamily="34" charset="0"/>
+              </a:defRPr>
+            </a:pPr>
+            <a:r>
+              <a:rPr lang="en-US" sz="1600" dirty="0">
+                <a:solidFill>
+                  <a:schemeClr val="bg1">
+                    <a:lumMod val="65000"/>
+                  </a:schemeClr>
+                </a:solidFill>
+                <a:latin typeface="Gill Sans MT" panose="020B0502020104020203" pitchFamily="34" charset="0"/>
+              </a:rPr>
+              <a:t>Power Generation (kW)</a:t>
+            </a:r>
+          </a:p>
+        </c:rich>
+      </c:tx>
       <c:layout>
         <c:manualLayout>
           <c:xMode val="edge"/>
           <c:yMode val="edge"/>
-          <c:x val="0.10022809648793901"/>
-          <c:y val="8.4112149532710276E-2"/>
+          <c:x val="0.19546619172603424"/>
+          <c:y val="7.9439252336448593E-2"/>
         </c:manualLayout>
       </c:layout>
       <c:overlay val="0"/>
-      <c:txPr>
-        <a:bodyPr/>
-        <a:lstStyle/>
-        <a:p>
-          <a:pPr>
-            <a:defRPr sz="2000"/>
-          </a:pPr>
-          <a:endParaRPr lang="en-US"/>
-        </a:p>
-      </c:txPr>
     </c:title>
     <c:autoTitleDeleted val="0"/>
     <c:plotArea>
@@ -210,11 +224,11 @@
           <c:showBubbleSize val="0"/>
         </c:dLbls>
         <c:gapWidth val="150"/>
-        <c:axId val="93221248"/>
-        <c:axId val="93222784"/>
+        <c:axId val="261313664"/>
+        <c:axId val="261315200"/>
       </c:barChart>
       <c:catAx>
-        <c:axId val="93221248"/>
+        <c:axId val="261313664"/>
         <c:scaling>
           <c:orientation val="minMax"/>
         </c:scaling>
@@ -223,7 +237,23 @@
         <c:majorTickMark val="out"/>
         <c:minorTickMark val="none"/>
         <c:tickLblPos val="nextTo"/>
-        <c:crossAx val="93222784"/>
+        <c:txPr>
+          <a:bodyPr/>
+          <a:lstStyle/>
+          <a:p>
+            <a:pPr>
+              <a:defRPr>
+                <a:solidFill>
+                  <a:schemeClr val="bg1">
+                    <a:lumMod val="65000"/>
+                  </a:schemeClr>
+                </a:solidFill>
+              </a:defRPr>
+            </a:pPr>
+            <a:endParaRPr lang="en-US"/>
+          </a:p>
+        </c:txPr>
+        <c:crossAx val="261315200"/>
         <c:crosses val="autoZero"/>
         <c:auto val="1"/>
         <c:lblAlgn val="ctr"/>
@@ -231,7 +261,7 @@
         <c:noMultiLvlLbl val="0"/>
       </c:catAx>
       <c:valAx>
-        <c:axId val="93222784"/>
+        <c:axId val="261315200"/>
         <c:scaling>
           <c:orientation val="minMax"/>
         </c:scaling>
@@ -242,7 +272,23 @@
         <c:majorTickMark val="out"/>
         <c:minorTickMark val="none"/>
         <c:tickLblPos val="nextTo"/>
-        <c:crossAx val="93221248"/>
+        <c:txPr>
+          <a:bodyPr/>
+          <a:lstStyle/>
+          <a:p>
+            <a:pPr>
+              <a:defRPr>
+                <a:solidFill>
+                  <a:schemeClr val="bg1">
+                    <a:lumMod val="65000"/>
+                  </a:schemeClr>
+                </a:solidFill>
+              </a:defRPr>
+            </a:pPr>
+            <a:endParaRPr lang="en-US"/>
+          </a:p>
+        </c:txPr>
+        <c:crossAx val="261313664"/>
         <c:crosses val="autoZero"/>
         <c:crossBetween val="between"/>
       </c:valAx>
@@ -251,6 +297,15 @@
     <c:dispBlanksAs val="gap"/>
     <c:showDLblsOverMax val="0"/>
   </c:chart>
+  <c:spPr>
+    <a:effectLst>
+      <a:glow rad="127000">
+        <a:schemeClr val="bg1">
+          <a:lumMod val="65000"/>
+        </a:schemeClr>
+      </a:glow>
+    </a:effectLst>
+  </c:spPr>
   <c:txPr>
     <a:bodyPr/>
     <a:lstStyle/>
@@ -461,7 +516,7 @@
           <a:p>
             <a:fld id="{C16DD436-9D72-4E70-A4EF-078584750049}" type="datetimeFigureOut">
               <a:rPr lang="en-US" smtClean="0"/>
-              <a:t>10/9/2014</a:t>
+              <a:t>10/10/2014</a:t>
             </a:fld>
             <a:endParaRPr lang="en-US"/>
           </a:p>
@@ -631,7 +686,7 @@
           <a:p>
             <a:fld id="{C16DD436-9D72-4E70-A4EF-078584750049}" type="datetimeFigureOut">
               <a:rPr lang="en-US" smtClean="0"/>
-              <a:t>10/9/2014</a:t>
+              <a:t>10/10/2014</a:t>
             </a:fld>
             <a:endParaRPr lang="en-US"/>
           </a:p>
@@ -811,7 +866,7 @@
           <a:p>
             <a:fld id="{C16DD436-9D72-4E70-A4EF-078584750049}" type="datetimeFigureOut">
               <a:rPr lang="en-US" smtClean="0"/>
-              <a:t>10/9/2014</a:t>
+              <a:t>10/10/2014</a:t>
             </a:fld>
             <a:endParaRPr lang="en-US"/>
           </a:p>
@@ -981,7 +1036,7 @@
           <a:p>
             <a:fld id="{C16DD436-9D72-4E70-A4EF-078584750049}" type="datetimeFigureOut">
               <a:rPr lang="en-US" smtClean="0"/>
-              <a:t>10/9/2014</a:t>
+              <a:t>10/10/2014</a:t>
             </a:fld>
             <a:endParaRPr lang="en-US"/>
           </a:p>
@@ -1227,7 +1282,7 @@
           <a:p>
             <a:fld id="{C16DD436-9D72-4E70-A4EF-078584750049}" type="datetimeFigureOut">
               <a:rPr lang="en-US" smtClean="0"/>
-              <a:t>10/9/2014</a:t>
+              <a:t>10/10/2014</a:t>
             </a:fld>
             <a:endParaRPr lang="en-US"/>
           </a:p>
@@ -1515,7 +1570,7 @@
           <a:p>
             <a:fld id="{C16DD436-9D72-4E70-A4EF-078584750049}" type="datetimeFigureOut">
               <a:rPr lang="en-US" smtClean="0"/>
-              <a:t>10/9/2014</a:t>
+              <a:t>10/10/2014</a:t>
             </a:fld>
             <a:endParaRPr lang="en-US"/>
           </a:p>
@@ -1937,7 +1992,7 @@
           <a:p>
             <a:fld id="{C16DD436-9D72-4E70-A4EF-078584750049}" type="datetimeFigureOut">
               <a:rPr lang="en-US" smtClean="0"/>
-              <a:t>10/9/2014</a:t>
+              <a:t>10/10/2014</a:t>
             </a:fld>
             <a:endParaRPr lang="en-US"/>
           </a:p>
@@ -2055,7 +2110,7 @@
           <a:p>
             <a:fld id="{C16DD436-9D72-4E70-A4EF-078584750049}" type="datetimeFigureOut">
               <a:rPr lang="en-US" smtClean="0"/>
-              <a:t>10/9/2014</a:t>
+              <a:t>10/10/2014</a:t>
             </a:fld>
             <a:endParaRPr lang="en-US"/>
           </a:p>
@@ -2150,7 +2205,7 @@
           <a:p>
             <a:fld id="{C16DD436-9D72-4E70-A4EF-078584750049}" type="datetimeFigureOut">
               <a:rPr lang="en-US" smtClean="0"/>
-              <a:t>10/9/2014</a:t>
+              <a:t>10/10/2014</a:t>
             </a:fld>
             <a:endParaRPr lang="en-US"/>
           </a:p>
@@ -2427,7 +2482,7 @@
           <a:p>
             <a:fld id="{C16DD436-9D72-4E70-A4EF-078584750049}" type="datetimeFigureOut">
               <a:rPr lang="en-US" smtClean="0"/>
-              <a:t>10/9/2014</a:t>
+              <a:t>10/10/2014</a:t>
             </a:fld>
             <a:endParaRPr lang="en-US"/>
           </a:p>
@@ -2680,7 +2735,7 @@
           <a:p>
             <a:fld id="{C16DD436-9D72-4E70-A4EF-078584750049}" type="datetimeFigureOut">
               <a:rPr lang="en-US" smtClean="0"/>
-              <a:t>10/9/2014</a:t>
+              <a:t>10/10/2014</a:t>
             </a:fld>
             <a:endParaRPr lang="en-US"/>
           </a:p>
@@ -2893,7 +2948,7 @@
           <a:p>
             <a:fld id="{C16DD436-9D72-4E70-A4EF-078584750049}" type="datetimeFigureOut">
               <a:rPr lang="en-US" smtClean="0"/>
-              <a:t>10/9/2014</a:t>
+              <a:t>10/10/2014</a:t>
             </a:fld>
             <a:endParaRPr lang="en-US"/>
           </a:p>
@@ -3291,8 +3346,8 @@
         </p:blipFill>
         <p:spPr bwMode="auto">
           <a:xfrm>
-            <a:off x="76200" y="152400"/>
-            <a:ext cx="4953000" cy="6574933"/>
+            <a:off x="228600" y="533400"/>
+            <a:ext cx="4590982" cy="6094367"/>
           </a:xfrm>
           <a:prstGeom prst="rect">
             <a:avLst/>
@@ -3330,30 +3385,141 @@
         </p:nvSpPr>
         <p:spPr>
           <a:xfrm>
-            <a:off x="1828800" y="272534"/>
-            <a:ext cx="3048000" cy="369332"/>
+            <a:off x="228600" y="160377"/>
+            <a:ext cx="3810000" cy="369332"/>
           </a:xfrm>
           <a:prstGeom prst="rect">
             <a:avLst/>
           </a:prstGeom>
           <a:solidFill>
-            <a:schemeClr val="bg1"/>
+            <a:schemeClr val="bg1">
+              <a:lumMod val="85000"/>
+            </a:schemeClr>
           </a:solidFill>
-          <a:ln w="15875">
-            <a:solidFill>
-              <a:schemeClr val="tx1"/>
-            </a:solidFill>
+          <a:ln>
+            <a:noFill/>
           </a:ln>
+          <a:effectLst>
+            <a:outerShdw blurRad="44450" dist="27940" dir="5400000" algn="ctr">
+              <a:srgbClr val="000000">
+                <a:alpha val="32000"/>
+              </a:srgbClr>
+            </a:outerShdw>
+          </a:effectLst>
+          <a:scene3d>
+            <a:camera prst="orthographicFront">
+              <a:rot lat="0" lon="0" rev="0"/>
+            </a:camera>
+            <a:lightRig rig="balanced" dir="t">
+              <a:rot lat="0" lon="0" rev="8700000"/>
+            </a:lightRig>
+          </a:scene3d>
+          <a:sp3d>
+            <a:bevelT w="190500" h="38100"/>
+          </a:sp3d>
         </p:spPr>
-        <p:txBody>
-          <a:bodyPr wrap="square" rtlCol="0">
-            <a:spAutoFit/>
+        <p:style>
+          <a:lnRef idx="2">
+            <a:schemeClr val="accent1">
+              <a:shade val="50000"/>
+            </a:schemeClr>
+          </a:lnRef>
+          <a:fillRef idx="1">
+            <a:schemeClr val="accent1"/>
+          </a:fillRef>
+          <a:effectRef idx="0">
+            <a:schemeClr val="accent1"/>
+          </a:effectRef>
+          <a:fontRef idx="minor">
+            <a:schemeClr val="lt1"/>
+          </a:fontRef>
+        </p:style>
+        <p:txBody>
+          <a:bodyPr rot="0" spcFirstLastPara="0" vertOverflow="overflow" horzOverflow="overflow" vert="horz" wrap="square" lIns="91440" tIns="45720" rIns="91440" bIns="45720" numCol="1" spcCol="0" rtlCol="0" fromWordArt="0" anchor="ctr" anchorCtr="0" forceAA="0" compatLnSpc="1">
+            <a:prstTxWarp prst="textNoShape">
+              <a:avLst/>
+            </a:prstTxWarp>
+            <a:noAutofit/>
           </a:bodyPr>
-          <a:lstStyle/>
-          <a:p>
-            <a:r>
-              <a:rPr lang="en-US" dirty="0" smtClean="0"/>
-              <a:t>Choose location (drop down)…</a:t>
+          <a:lstStyle>
+            <a:defPPr>
+              <a:defRPr lang="en-US"/>
+            </a:defPPr>
+            <a:lvl1pPr algn="ctr">
+              <a:defRPr>
+                <a:solidFill>
+                  <a:schemeClr val="tx2">
+                    <a:lumMod val="60000"/>
+                    <a:lumOff val="40000"/>
+                  </a:schemeClr>
+                </a:solidFill>
+              </a:defRPr>
+            </a:lvl1pPr>
+            <a:lvl2pPr>
+              <a:defRPr>
+                <a:solidFill>
+                  <a:schemeClr val="lt1"/>
+                </a:solidFill>
+              </a:defRPr>
+            </a:lvl2pPr>
+            <a:lvl3pPr>
+              <a:defRPr>
+                <a:solidFill>
+                  <a:schemeClr val="lt1"/>
+                </a:solidFill>
+              </a:defRPr>
+            </a:lvl3pPr>
+            <a:lvl4pPr>
+              <a:defRPr>
+                <a:solidFill>
+                  <a:schemeClr val="lt1"/>
+                </a:solidFill>
+              </a:defRPr>
+            </a:lvl4pPr>
+            <a:lvl5pPr>
+              <a:defRPr>
+                <a:solidFill>
+                  <a:schemeClr val="lt1"/>
+                </a:solidFill>
+              </a:defRPr>
+            </a:lvl5pPr>
+            <a:lvl6pPr>
+              <a:defRPr>
+                <a:solidFill>
+                  <a:schemeClr val="lt1"/>
+                </a:solidFill>
+              </a:defRPr>
+            </a:lvl6pPr>
+            <a:lvl7pPr>
+              <a:defRPr>
+                <a:solidFill>
+                  <a:schemeClr val="lt1"/>
+                </a:solidFill>
+              </a:defRPr>
+            </a:lvl7pPr>
+            <a:lvl8pPr>
+              <a:defRPr>
+                <a:solidFill>
+                  <a:schemeClr val="lt1"/>
+                </a:solidFill>
+              </a:defRPr>
+            </a:lvl8pPr>
+            <a:lvl9pPr>
+              <a:defRPr>
+                <a:solidFill>
+                  <a:schemeClr val="lt1"/>
+                </a:solidFill>
+              </a:defRPr>
+            </a:lvl9pPr>
+          </a:lstStyle>
+          <a:p>
+            <a:r>
+              <a:rPr lang="en-US" dirty="0"/>
+              <a:t>Choose</a:t>
+            </a:r>
+            <a:r>
+              <a:rPr lang="en-US" dirty="0"/>
+              <a:t> location (drop down)…</a:t>
             </a:r>
             <a:endParaRPr lang="en-US" dirty="0"/>
           </a:p>
@@ -3382,37 +3548,97 @@
           <a:lstStyle/>
           <a:p>
             <a:r>
-              <a:rPr lang="en-US" dirty="0" smtClean="0"/>
-              <a:t>App Title</a:t>
-            </a:r>
-          </a:p>
-          <a:p>
-            <a:r>
-              <a:rPr lang="en-US" dirty="0" smtClean="0"/>
-              <a:t>Choose location to get started</a:t>
-            </a:r>
-          </a:p>
-          <a:p>
-            <a:endParaRPr lang="en-US" sz="600" dirty="0"/>
-          </a:p>
-          <a:p>
-            <a:r>
-              <a:rPr lang="en-US" dirty="0" smtClean="0"/>
+              <a:rPr lang="en-US" b="1" dirty="0" smtClean="0">
+                <a:solidFill>
+                  <a:schemeClr val="bg1">
+                    <a:lumMod val="65000"/>
+                  </a:schemeClr>
+                </a:solidFill>
+                <a:latin typeface="Gill Sans MT" panose="020B0502020104020203" pitchFamily="34" charset="0"/>
+              </a:rPr>
+              <a:t>SOLARIZING VERMONT</a:t>
+            </a:r>
+          </a:p>
+          <a:p>
+            <a:r>
+              <a:rPr lang="en-US" dirty="0" smtClean="0">
+                <a:solidFill>
+                  <a:schemeClr val="bg1">
+                    <a:lumMod val="65000"/>
+                  </a:schemeClr>
+                </a:solidFill>
+                <a:latin typeface="Gill Sans MT" panose="020B0502020104020203" pitchFamily="34" charset="0"/>
+              </a:rPr>
+              <a:t>Choose </a:t>
+            </a:r>
+            <a:r>
+              <a:rPr lang="en-US" dirty="0" smtClean="0">
+                <a:solidFill>
+                  <a:schemeClr val="bg1">
+                    <a:lumMod val="65000"/>
+                  </a:schemeClr>
+                </a:solidFill>
+                <a:latin typeface="Gill Sans MT" panose="020B0502020104020203" pitchFamily="34" charset="0"/>
+              </a:rPr>
+              <a:t>location to get started</a:t>
+            </a:r>
+          </a:p>
+          <a:p>
+            <a:endParaRPr lang="en-US" sz="600" dirty="0">
+              <a:solidFill>
+                <a:schemeClr val="bg1">
+                  <a:lumMod val="65000"/>
+                </a:schemeClr>
+              </a:solidFill>
+              <a:latin typeface="Gill Sans MT" panose="020B0502020104020203" pitchFamily="34" charset="0"/>
+            </a:endParaRPr>
+          </a:p>
+          <a:p>
+            <a:r>
+              <a:rPr lang="en-US" dirty="0" smtClean="0">
+                <a:solidFill>
+                  <a:schemeClr val="bg1">
+                    <a:lumMod val="65000"/>
+                  </a:schemeClr>
+                </a:solidFill>
+                <a:latin typeface="Gill Sans MT" panose="020B0502020104020203" pitchFamily="34" charset="0"/>
+              </a:rPr>
               <a:t>Selected Town Name</a:t>
             </a:r>
           </a:p>
           <a:p>
             <a:r>
-              <a:rPr lang="en-US" sz="1400" dirty="0" smtClean="0"/>
+              <a:rPr lang="en-US" sz="1400" dirty="0" smtClean="0">
+                <a:solidFill>
+                  <a:schemeClr val="bg1">
+                    <a:lumMod val="65000"/>
+                  </a:schemeClr>
+                </a:solidFill>
+                <a:latin typeface="Gill Sans MT" panose="020B0502020104020203" pitchFamily="34" charset="0"/>
+              </a:rPr>
               <a:t>Annual kWh Usage: XXX,XXX</a:t>
             </a:r>
           </a:p>
           <a:p>
             <a:r>
-              <a:rPr lang="en-US" sz="1400" dirty="0" smtClean="0"/>
+              <a:rPr lang="en-US" sz="1400" dirty="0" smtClean="0">
+                <a:solidFill>
+                  <a:schemeClr val="bg1">
+                    <a:lumMod val="65000"/>
+                  </a:schemeClr>
+                </a:solidFill>
+                <a:latin typeface="Gill Sans MT" panose="020B0502020104020203" pitchFamily="34" charset="0"/>
+              </a:rPr>
               <a:t>Average kWh Usage/household: X,XXX </a:t>
             </a:r>
-            <a:endParaRPr lang="en-US" sz="1400" dirty="0"/>
+            <a:endParaRPr lang="en-US" sz="1400" dirty="0">
+              <a:solidFill>
+                <a:schemeClr val="bg1">
+                  <a:lumMod val="65000"/>
+                </a:schemeClr>
+              </a:solidFill>
+              <a:latin typeface="Gill Sans MT" panose="020B0502020104020203" pitchFamily="34" charset="0"/>
+            </a:endParaRPr>
           </a:p>
         </p:txBody>
       </p:sp>
@@ -3423,7 +3649,7 @@
           <p:nvPr>
             <p:extLst>
               <p:ext uri="{D42A27DB-BD31-4B8C-83A1-F6EECF244321}">
-                <p14:modId xmlns:p14="http://schemas.microsoft.com/office/powerpoint/2010/main" val="3811011695"/>
+                <p14:modId xmlns:p14="http://schemas.microsoft.com/office/powerpoint/2010/main" val="2477189366"/>
               </p:ext>
             </p:extLst>
           </p:nvPr>
@@ -3446,40 +3672,142 @@
         </p:nvSpPr>
         <p:spPr>
           <a:xfrm>
-            <a:off x="5353050" y="1833086"/>
+            <a:off x="5324475" y="1676400"/>
             <a:ext cx="1905000" cy="369332"/>
           </a:xfrm>
           <a:prstGeom prst="rect">
             <a:avLst/>
           </a:prstGeom>
           <a:solidFill>
-            <a:schemeClr val="accent1">
-              <a:lumMod val="20000"/>
-              <a:lumOff val="80000"/>
+            <a:schemeClr val="bg1">
+              <a:lumMod val="85000"/>
             </a:schemeClr>
           </a:solidFill>
-          <a:ln w="15875">
-            <a:solidFill>
-              <a:schemeClr val="tx1"/>
-            </a:solidFill>
+          <a:ln>
+            <a:noFill/>
           </a:ln>
           <a:effectLst>
-            <a:outerShdw blurRad="50800" dist="50800" dir="5400000" algn="ctr" rotWithShape="0">
-              <a:schemeClr val="bg1"/>
+            <a:outerShdw blurRad="44450" dist="27940" dir="5400000" algn="ctr">
+              <a:srgbClr val="000000">
+                <a:alpha val="32000"/>
+              </a:srgbClr>
             </a:outerShdw>
           </a:effectLst>
+          <a:scene3d>
+            <a:camera prst="orthographicFront">
+              <a:rot lat="0" lon="0" rev="0"/>
+            </a:camera>
+            <a:lightRig rig="balanced" dir="t">
+              <a:rot lat="0" lon="0" rev="8700000"/>
+            </a:lightRig>
+          </a:scene3d>
+          <a:sp3d>
+            <a:bevelT w="190500" h="38100"/>
+          </a:sp3d>
         </p:spPr>
-        <p:txBody>
-          <a:bodyPr wrap="square" rtlCol="0">
-            <a:spAutoFit/>
+        <p:style>
+          <a:lnRef idx="2">
+            <a:schemeClr val="accent1">
+              <a:shade val="50000"/>
+            </a:schemeClr>
+          </a:lnRef>
+          <a:fillRef idx="1">
+            <a:schemeClr val="accent1"/>
+          </a:fillRef>
+          <a:effectRef idx="0">
+            <a:schemeClr val="accent1"/>
+          </a:effectRef>
+          <a:fontRef idx="minor">
+            <a:schemeClr val="lt1"/>
+          </a:fontRef>
+        </p:style>
+        <p:txBody>
+          <a:bodyPr rot="0" spcFirstLastPara="0" vertOverflow="overflow" horzOverflow="overflow" vert="horz" wrap="square" lIns="91440" tIns="45720" rIns="91440" bIns="45720" numCol="1" spcCol="0" rtlCol="0" fromWordArt="0" anchor="ctr" anchorCtr="0" forceAA="0" compatLnSpc="1">
+            <a:prstTxWarp prst="textNoShape">
+              <a:avLst/>
+            </a:prstTxWarp>
+            <a:noAutofit/>
           </a:bodyPr>
-          <a:lstStyle/>
-          <a:p>
-            <a:r>
-              <a:rPr lang="en-US" dirty="0" smtClean="0"/>
-              <a:t>Add solar panels</a:t>
-            </a:r>
-            <a:endParaRPr lang="en-US" dirty="0"/>
+          <a:lstStyle>
+            <a:defPPr>
+              <a:defRPr lang="en-US"/>
+            </a:defPPr>
+            <a:lvl1pPr algn="ctr">
+              <a:defRPr>
+                <a:solidFill>
+                  <a:schemeClr val="lt1"/>
+                </a:solidFill>
+              </a:defRPr>
+            </a:lvl1pPr>
+            <a:lvl2pPr>
+              <a:defRPr>
+                <a:solidFill>
+                  <a:schemeClr val="lt1"/>
+                </a:solidFill>
+              </a:defRPr>
+            </a:lvl2pPr>
+            <a:lvl3pPr>
+              <a:defRPr>
+                <a:solidFill>
+                  <a:schemeClr val="lt1"/>
+                </a:solidFill>
+              </a:defRPr>
+            </a:lvl3pPr>
+            <a:lvl4pPr>
+              <a:defRPr>
+                <a:solidFill>
+                  <a:schemeClr val="lt1"/>
+                </a:solidFill>
+              </a:defRPr>
+            </a:lvl4pPr>
+            <a:lvl5pPr>
+              <a:defRPr>
+                <a:solidFill>
+                  <a:schemeClr val="lt1"/>
+                </a:solidFill>
+              </a:defRPr>
+            </a:lvl5pPr>
+            <a:lvl6pPr>
+              <a:defRPr>
+                <a:solidFill>
+                  <a:schemeClr val="lt1"/>
+                </a:solidFill>
+              </a:defRPr>
+            </a:lvl6pPr>
+            <a:lvl7pPr>
+              <a:defRPr>
+                <a:solidFill>
+                  <a:schemeClr val="lt1"/>
+                </a:solidFill>
+              </a:defRPr>
+            </a:lvl7pPr>
+            <a:lvl8pPr>
+              <a:defRPr>
+                <a:solidFill>
+                  <a:schemeClr val="lt1"/>
+                </a:solidFill>
+              </a:defRPr>
+            </a:lvl8pPr>
+            <a:lvl9pPr>
+              <a:defRPr>
+                <a:solidFill>
+                  <a:schemeClr val="lt1"/>
+                </a:solidFill>
+              </a:defRPr>
+            </a:lvl9pPr>
+          </a:lstStyle>
+          <a:p>
+            <a:r>
+              <a:rPr lang="en-US" dirty="0">
+                <a:solidFill>
+                  <a:schemeClr val="tx2">
+                    <a:lumMod val="60000"/>
+                    <a:lumOff val="40000"/>
+                  </a:schemeClr>
+                </a:solidFill>
+              </a:rPr>
+              <a:t>Add Solar Panels</a:t>
+            </a:r>
           </a:p>
         </p:txBody>
       </p:sp>
@@ -3491,40 +3819,142 @@
         </p:nvSpPr>
         <p:spPr>
           <a:xfrm>
-            <a:off x="5372100" y="2211348"/>
+            <a:off x="5334000" y="2181225"/>
             <a:ext cx="1905000" cy="369332"/>
           </a:xfrm>
           <a:prstGeom prst="rect">
             <a:avLst/>
           </a:prstGeom>
           <a:solidFill>
-            <a:schemeClr val="accent1">
-              <a:lumMod val="20000"/>
-              <a:lumOff val="80000"/>
+            <a:schemeClr val="bg1">
+              <a:lumMod val="85000"/>
             </a:schemeClr>
           </a:solidFill>
-          <a:ln w="15875">
-            <a:solidFill>
-              <a:schemeClr val="tx1"/>
-            </a:solidFill>
+          <a:ln>
+            <a:noFill/>
           </a:ln>
           <a:effectLst>
-            <a:outerShdw blurRad="50800" dist="50800" dir="5400000" algn="ctr" rotWithShape="0">
-              <a:schemeClr val="bg1"/>
+            <a:outerShdw blurRad="44450" dist="27940" dir="5400000" algn="ctr">
+              <a:srgbClr val="000000">
+                <a:alpha val="32000"/>
+              </a:srgbClr>
             </a:outerShdw>
           </a:effectLst>
+          <a:scene3d>
+            <a:camera prst="orthographicFront">
+              <a:rot lat="0" lon="0" rev="0"/>
+            </a:camera>
+            <a:lightRig rig="balanced" dir="t">
+              <a:rot lat="0" lon="0" rev="8700000"/>
+            </a:lightRig>
+          </a:scene3d>
+          <a:sp3d>
+            <a:bevelT w="190500" h="38100"/>
+          </a:sp3d>
         </p:spPr>
-        <p:txBody>
-          <a:bodyPr wrap="square" rtlCol="0">
-            <a:spAutoFit/>
+        <p:style>
+          <a:lnRef idx="2">
+            <a:schemeClr val="accent1">
+              <a:shade val="50000"/>
+            </a:schemeClr>
+          </a:lnRef>
+          <a:fillRef idx="1">
+            <a:schemeClr val="accent1"/>
+          </a:fillRef>
+          <a:effectRef idx="0">
+            <a:schemeClr val="accent1"/>
+          </a:effectRef>
+          <a:fontRef idx="minor">
+            <a:schemeClr val="lt1"/>
+          </a:fontRef>
+        </p:style>
+        <p:txBody>
+          <a:bodyPr rot="0" spcFirstLastPara="0" vertOverflow="overflow" horzOverflow="overflow" vert="horz" wrap="square" lIns="91440" tIns="45720" rIns="91440" bIns="45720" numCol="1" spcCol="0" rtlCol="0" fromWordArt="0" anchor="ctr" anchorCtr="0" forceAA="0" compatLnSpc="1">
+            <a:prstTxWarp prst="textNoShape">
+              <a:avLst/>
+            </a:prstTxWarp>
+            <a:noAutofit/>
           </a:bodyPr>
-          <a:lstStyle/>
-          <a:p>
-            <a:r>
-              <a:rPr lang="en-US" dirty="0" smtClean="0"/>
-              <a:t>Start Over</a:t>
-            </a:r>
-            <a:endParaRPr lang="en-US" dirty="0"/>
+          <a:lstStyle>
+            <a:defPPr>
+              <a:defRPr lang="en-US"/>
+            </a:defPPr>
+            <a:lvl1pPr algn="ctr">
+              <a:defRPr>
+                <a:solidFill>
+                  <a:schemeClr val="tx2">
+                    <a:lumMod val="60000"/>
+                    <a:lumOff val="40000"/>
+                  </a:schemeClr>
+                </a:solidFill>
+              </a:defRPr>
+            </a:lvl1pPr>
+            <a:lvl2pPr>
+              <a:defRPr>
+                <a:solidFill>
+                  <a:schemeClr val="lt1"/>
+                </a:solidFill>
+              </a:defRPr>
+            </a:lvl2pPr>
+            <a:lvl3pPr>
+              <a:defRPr>
+                <a:solidFill>
+                  <a:schemeClr val="lt1"/>
+                </a:solidFill>
+              </a:defRPr>
+            </a:lvl3pPr>
+            <a:lvl4pPr>
+              <a:defRPr>
+                <a:solidFill>
+                  <a:schemeClr val="lt1"/>
+                </a:solidFill>
+              </a:defRPr>
+            </a:lvl4pPr>
+            <a:lvl5pPr>
+              <a:defRPr>
+                <a:solidFill>
+                  <a:schemeClr val="lt1"/>
+                </a:solidFill>
+              </a:defRPr>
+            </a:lvl5pPr>
+            <a:lvl6pPr>
+              <a:defRPr>
+                <a:solidFill>
+                  <a:schemeClr val="lt1"/>
+                </a:solidFill>
+              </a:defRPr>
+            </a:lvl6pPr>
+            <a:lvl7pPr>
+              <a:defRPr>
+                <a:solidFill>
+                  <a:schemeClr val="lt1"/>
+                </a:solidFill>
+              </a:defRPr>
+            </a:lvl7pPr>
+            <a:lvl8pPr>
+              <a:defRPr>
+                <a:solidFill>
+                  <a:schemeClr val="lt1"/>
+                </a:solidFill>
+              </a:defRPr>
+            </a:lvl8pPr>
+            <a:lvl9pPr>
+              <a:defRPr>
+                <a:solidFill>
+                  <a:schemeClr val="lt1"/>
+                </a:solidFill>
+              </a:defRPr>
+            </a:lvl9pPr>
+          </a:lstStyle>
+          <a:p>
+            <a:r>
+              <a:rPr lang="en-US" dirty="0"/>
+              <a:t>Start </a:t>
+            </a:r>
+            <a:r>
+              <a:rPr lang="en-US" dirty="0"/>
+              <a:t>Over</a:t>
+            </a:r>
           </a:p>
         </p:txBody>
       </p:sp>
@@ -3551,15 +3981,58 @@
           <a:lstStyle/>
           <a:p>
             <a:r>
-              <a:rPr lang="en-US" sz="1200" dirty="0" smtClean="0"/>
-              <a:t>This app brought to you by Team Stone for </a:t>
-            </a:r>
-            <a:r>
-              <a:rPr lang="en-US" sz="1200" dirty="0" err="1" smtClean="0"/>
+              <a:rPr lang="en-US" sz="1200" dirty="0" smtClean="0">
+                <a:solidFill>
+                  <a:schemeClr val="bg1">
+                    <a:lumMod val="65000"/>
+                  </a:schemeClr>
+                </a:solidFill>
+                <a:latin typeface="Gill Sans MT" panose="020B0502020104020203" pitchFamily="34" charset="0"/>
+              </a:rPr>
+              <a:t>This app </a:t>
+            </a:r>
+            <a:r>
+              <a:rPr lang="en-US" sz="1200" dirty="0" smtClean="0">
+                <a:solidFill>
+                  <a:schemeClr val="bg1">
+                    <a:lumMod val="65000"/>
+                  </a:schemeClr>
+                </a:solidFill>
+                <a:latin typeface="Gill Sans MT" panose="020B0502020104020203" pitchFamily="34" charset="0"/>
+              </a:rPr>
+              <a:t>developed by </a:t>
+            </a:r>
+            <a:r>
+              <a:rPr lang="en-US" sz="1200" dirty="0" smtClean="0">
+                <a:solidFill>
+                  <a:schemeClr val="bg1">
+                    <a:lumMod val="65000"/>
+                  </a:schemeClr>
+                </a:solidFill>
+                <a:latin typeface="Gill Sans MT" panose="020B0502020104020203" pitchFamily="34" charset="0"/>
+              </a:rPr>
+              <a:t>Team Stone for </a:t>
+            </a:r>
+            <a:r>
+              <a:rPr lang="en-US" sz="1200" dirty="0" err="1" smtClean="0">
+                <a:solidFill>
+                  <a:schemeClr val="bg1">
+                    <a:lumMod val="65000"/>
+                  </a:schemeClr>
+                </a:solidFill>
+                <a:latin typeface="Gill Sans MT" panose="020B0502020104020203" pitchFamily="34" charset="0"/>
+              </a:rPr>
               <a:t>HackVT</a:t>
             </a:r>
             <a:r>
-              <a:rPr lang="en-US" sz="1200" dirty="0" smtClean="0"/>
+              <a:rPr lang="en-US" sz="1200" dirty="0" smtClean="0">
+                <a:solidFill>
+                  <a:schemeClr val="bg1">
+                    <a:lumMod val="65000"/>
+                  </a:schemeClr>
+                </a:solidFill>
+                <a:latin typeface="Gill Sans MT" panose="020B0502020104020203" pitchFamily="34" charset="0"/>
+              </a:rPr>
               <a:t> 2014 using date supplied by Efficiency Vermont</a:t>
             </a:r>
           </a:p>
@@ -3573,37 +4046,136 @@
         </p:nvSpPr>
         <p:spPr>
           <a:xfrm>
-            <a:off x="5391150" y="3458916"/>
+            <a:off x="6019800" y="3458916"/>
             <a:ext cx="1905000" cy="369332"/>
           </a:xfrm>
           <a:prstGeom prst="rect">
             <a:avLst/>
           </a:prstGeom>
           <a:solidFill>
-            <a:schemeClr val="accent1">
-              <a:lumMod val="20000"/>
-              <a:lumOff val="80000"/>
+            <a:schemeClr val="bg1">
+              <a:lumMod val="85000"/>
             </a:schemeClr>
           </a:solidFill>
-          <a:ln w="15875">
-            <a:solidFill>
-              <a:schemeClr val="tx1"/>
-            </a:solidFill>
+          <a:ln>
+            <a:noFill/>
           </a:ln>
           <a:effectLst>
-            <a:outerShdw blurRad="50800" dist="50800" dir="5400000" algn="ctr" rotWithShape="0">
-              <a:schemeClr val="bg1"/>
+            <a:outerShdw blurRad="44450" dist="27940" dir="5400000" algn="ctr">
+              <a:srgbClr val="000000">
+                <a:alpha val="32000"/>
+              </a:srgbClr>
             </a:outerShdw>
           </a:effectLst>
+          <a:scene3d>
+            <a:camera prst="orthographicFront">
+              <a:rot lat="0" lon="0" rev="0"/>
+            </a:camera>
+            <a:lightRig rig="balanced" dir="t">
+              <a:rot lat="0" lon="0" rev="8700000"/>
+            </a:lightRig>
+          </a:scene3d>
+          <a:sp3d>
+            <a:bevelT w="190500" h="38100"/>
+          </a:sp3d>
         </p:spPr>
-        <p:txBody>
-          <a:bodyPr wrap="square" rtlCol="0">
-            <a:spAutoFit/>
+        <p:style>
+          <a:lnRef idx="2">
+            <a:schemeClr val="accent1">
+              <a:shade val="50000"/>
+            </a:schemeClr>
+          </a:lnRef>
+          <a:fillRef idx="1">
+            <a:schemeClr val="accent1"/>
+          </a:fillRef>
+          <a:effectRef idx="0">
+            <a:schemeClr val="accent1"/>
+          </a:effectRef>
+          <a:fontRef idx="minor">
+            <a:schemeClr val="lt1"/>
+          </a:fontRef>
+        </p:style>
+        <p:txBody>
+          <a:bodyPr rot="0" spcFirstLastPara="0" vertOverflow="overflow" horzOverflow="overflow" vert="horz" wrap="square" lIns="91440" tIns="45720" rIns="91440" bIns="45720" numCol="1" spcCol="0" rtlCol="0" fromWordArt="0" anchor="ctr" anchorCtr="0" forceAA="0" compatLnSpc="1">
+            <a:prstTxWarp prst="textNoShape">
+              <a:avLst/>
+            </a:prstTxWarp>
+            <a:noAutofit/>
           </a:bodyPr>
-          <a:lstStyle/>
-          <a:p>
-            <a:r>
-              <a:rPr lang="en-US" dirty="0" smtClean="0"/>
+          <a:lstStyle>
+            <a:defPPr>
+              <a:defRPr lang="en-US"/>
+            </a:defPPr>
+            <a:lvl1pPr algn="ctr">
+              <a:defRPr>
+                <a:solidFill>
+                  <a:schemeClr val="tx2">
+                    <a:lumMod val="60000"/>
+                    <a:lumOff val="40000"/>
+                  </a:schemeClr>
+                </a:solidFill>
+              </a:defRPr>
+            </a:lvl1pPr>
+            <a:lvl2pPr>
+              <a:defRPr>
+                <a:solidFill>
+                  <a:schemeClr val="lt1"/>
+                </a:solidFill>
+              </a:defRPr>
+            </a:lvl2pPr>
+            <a:lvl3pPr>
+              <a:defRPr>
+                <a:solidFill>
+                  <a:schemeClr val="lt1"/>
+                </a:solidFill>
+              </a:defRPr>
+            </a:lvl3pPr>
+            <a:lvl4pPr>
+              <a:defRPr>
+                <a:solidFill>
+                  <a:schemeClr val="lt1"/>
+                </a:solidFill>
+              </a:defRPr>
+            </a:lvl4pPr>
+            <a:lvl5pPr>
+              <a:defRPr>
+                <a:solidFill>
+                  <a:schemeClr val="lt1"/>
+                </a:solidFill>
+              </a:defRPr>
+            </a:lvl5pPr>
+            <a:lvl6pPr>
+              <a:defRPr>
+                <a:solidFill>
+                  <a:schemeClr val="lt1"/>
+                </a:solidFill>
+              </a:defRPr>
+            </a:lvl6pPr>
+            <a:lvl7pPr>
+              <a:defRPr>
+                <a:solidFill>
+                  <a:schemeClr val="lt1"/>
+                </a:solidFill>
+              </a:defRPr>
+            </a:lvl7pPr>
+            <a:lvl8pPr>
+              <a:defRPr>
+                <a:solidFill>
+                  <a:schemeClr val="lt1"/>
+                </a:solidFill>
+              </a:defRPr>
+            </a:lvl8pPr>
+            <a:lvl9pPr>
+              <a:defRPr>
+                <a:solidFill>
+                  <a:schemeClr val="lt1"/>
+                </a:solidFill>
+              </a:defRPr>
+            </a:lvl9pPr>
+          </a:lstStyle>
+          <a:p>
+            <a:r>
+              <a:rPr lang="en-US" dirty="0"/>
               <a:t>Delete Selected</a:t>
             </a:r>
             <a:endParaRPr lang="en-US" dirty="0"/>
@@ -3618,7 +4190,7 @@
         </p:nvSpPr>
         <p:spPr>
           <a:xfrm>
-            <a:off x="5391150" y="2737247"/>
+            <a:off x="6019800" y="2667000"/>
             <a:ext cx="2286000" cy="800219"/>
           </a:xfrm>
           <a:prstGeom prst="rect">
@@ -3633,22 +4205,46 @@
           <a:lstStyle/>
           <a:p>
             <a:r>
-              <a:rPr lang="en-US" dirty="0" smtClean="0"/>
+              <a:rPr lang="en-US" dirty="0" smtClean="0">
+                <a:solidFill>
+                  <a:schemeClr val="bg1">
+                    <a:lumMod val="65000"/>
+                  </a:schemeClr>
+                </a:solidFill>
+              </a:rPr>
               <a:t>Selected panels</a:t>
             </a:r>
           </a:p>
           <a:p>
             <a:r>
-              <a:rPr lang="en-US" sz="1400" dirty="0" smtClean="0"/>
+              <a:rPr lang="en-US" sz="1400" dirty="0" smtClean="0">
+                <a:solidFill>
+                  <a:schemeClr val="bg1">
+                    <a:lumMod val="65000"/>
+                  </a:schemeClr>
+                </a:solidFill>
+              </a:rPr>
               <a:t>Area: XXX</a:t>
             </a:r>
           </a:p>
           <a:p>
             <a:r>
-              <a:rPr lang="en-US" sz="1400" dirty="0" smtClean="0"/>
+              <a:rPr lang="en-US" sz="1400" dirty="0" smtClean="0">
+                <a:solidFill>
+                  <a:schemeClr val="bg1">
+                    <a:lumMod val="65000"/>
+                  </a:schemeClr>
+                </a:solidFill>
+              </a:rPr>
               <a:t>Power: XXX</a:t>
             </a:r>
-            <a:endParaRPr lang="en-US" sz="1400" dirty="0"/>
+            <a:endParaRPr lang="en-US" sz="1400" dirty="0">
+              <a:solidFill>
+                <a:schemeClr val="bg1">
+                  <a:lumMod val="65000"/>
+                </a:schemeClr>
+              </a:solidFill>
+            </a:endParaRPr>
           </a:p>
         </p:txBody>
       </p:sp>
@@ -3660,37 +4256,136 @@
         </p:nvSpPr>
         <p:spPr>
           <a:xfrm>
-            <a:off x="7467600" y="2218730"/>
+            <a:off x="7467600" y="2181225"/>
             <a:ext cx="1276350" cy="369332"/>
           </a:xfrm>
           <a:prstGeom prst="rect">
             <a:avLst/>
           </a:prstGeom>
           <a:solidFill>
-            <a:schemeClr val="accent1">
-              <a:lumMod val="20000"/>
-              <a:lumOff val="80000"/>
+            <a:schemeClr val="bg1">
+              <a:lumMod val="85000"/>
             </a:schemeClr>
           </a:solidFill>
-          <a:ln w="15875">
-            <a:solidFill>
-              <a:schemeClr val="tx1"/>
-            </a:solidFill>
+          <a:ln>
+            <a:noFill/>
           </a:ln>
           <a:effectLst>
-            <a:outerShdw blurRad="50800" dist="50800" dir="5400000" algn="ctr" rotWithShape="0">
-              <a:schemeClr val="bg1"/>
+            <a:outerShdw blurRad="44450" dist="27940" dir="5400000" algn="ctr">
+              <a:srgbClr val="000000">
+                <a:alpha val="32000"/>
+              </a:srgbClr>
             </a:outerShdw>
           </a:effectLst>
+          <a:scene3d>
+            <a:camera prst="orthographicFront">
+              <a:rot lat="0" lon="0" rev="0"/>
+            </a:camera>
+            <a:lightRig rig="balanced" dir="t">
+              <a:rot lat="0" lon="0" rev="8700000"/>
+            </a:lightRig>
+          </a:scene3d>
+          <a:sp3d>
+            <a:bevelT w="190500" h="38100"/>
+          </a:sp3d>
         </p:spPr>
-        <p:txBody>
-          <a:bodyPr wrap="square" rtlCol="0">
-            <a:spAutoFit/>
+        <p:style>
+          <a:lnRef idx="2">
+            <a:schemeClr val="accent1">
+              <a:shade val="50000"/>
+            </a:schemeClr>
+          </a:lnRef>
+          <a:fillRef idx="1">
+            <a:schemeClr val="accent1"/>
+          </a:fillRef>
+          <a:effectRef idx="0">
+            <a:schemeClr val="accent1"/>
+          </a:effectRef>
+          <a:fontRef idx="minor">
+            <a:schemeClr val="lt1"/>
+          </a:fontRef>
+        </p:style>
+        <p:txBody>
+          <a:bodyPr rot="0" spcFirstLastPara="0" vertOverflow="overflow" horzOverflow="overflow" vert="horz" wrap="square" lIns="91440" tIns="45720" rIns="91440" bIns="45720" numCol="1" spcCol="0" rtlCol="0" fromWordArt="0" anchor="ctr" anchorCtr="0" forceAA="0" compatLnSpc="1">
+            <a:prstTxWarp prst="textNoShape">
+              <a:avLst/>
+            </a:prstTxWarp>
+            <a:noAutofit/>
           </a:bodyPr>
-          <a:lstStyle/>
-          <a:p>
-            <a:r>
-              <a:rPr lang="en-US" dirty="0" smtClean="0"/>
+          <a:lstStyle>
+            <a:defPPr>
+              <a:defRPr lang="en-US"/>
+            </a:defPPr>
+            <a:lvl1pPr algn="ctr">
+              <a:defRPr>
+                <a:solidFill>
+                  <a:schemeClr val="tx2">
+                    <a:lumMod val="60000"/>
+                    <a:lumOff val="40000"/>
+                  </a:schemeClr>
+                </a:solidFill>
+              </a:defRPr>
+            </a:lvl1pPr>
+            <a:lvl2pPr>
+              <a:defRPr>
+                <a:solidFill>
+                  <a:schemeClr val="lt1"/>
+                </a:solidFill>
+              </a:defRPr>
+            </a:lvl2pPr>
+            <a:lvl3pPr>
+              <a:defRPr>
+                <a:solidFill>
+                  <a:schemeClr val="lt1"/>
+                </a:solidFill>
+              </a:defRPr>
+            </a:lvl3pPr>
+            <a:lvl4pPr>
+              <a:defRPr>
+                <a:solidFill>
+                  <a:schemeClr val="lt1"/>
+                </a:solidFill>
+              </a:defRPr>
+            </a:lvl4pPr>
+            <a:lvl5pPr>
+              <a:defRPr>
+                <a:solidFill>
+                  <a:schemeClr val="lt1"/>
+                </a:solidFill>
+              </a:defRPr>
+            </a:lvl5pPr>
+            <a:lvl6pPr>
+              <a:defRPr>
+                <a:solidFill>
+                  <a:schemeClr val="lt1"/>
+                </a:solidFill>
+              </a:defRPr>
+            </a:lvl6pPr>
+            <a:lvl7pPr>
+              <a:defRPr>
+                <a:solidFill>
+                  <a:schemeClr val="lt1"/>
+                </a:solidFill>
+              </a:defRPr>
+            </a:lvl7pPr>
+            <a:lvl8pPr>
+              <a:defRPr>
+                <a:solidFill>
+                  <a:schemeClr val="lt1"/>
+                </a:solidFill>
+              </a:defRPr>
+            </a:lvl8pPr>
+            <a:lvl9pPr>
+              <a:defRPr>
+                <a:solidFill>
+                  <a:schemeClr val="lt1"/>
+                </a:solidFill>
+              </a:defRPr>
+            </a:lvl9pPr>
+          </a:lstStyle>
+          <a:p>
+            <a:r>
+              <a:rPr lang="en-US" dirty="0"/>
               <a:t>Load Map</a:t>
             </a:r>
             <a:endParaRPr lang="en-US" dirty="0"/>
@@ -3705,37 +4400,136 @@
         </p:nvSpPr>
         <p:spPr>
           <a:xfrm>
-            <a:off x="7467600" y="1809750"/>
+            <a:off x="7467600" y="1693307"/>
             <a:ext cx="1276350" cy="369332"/>
           </a:xfrm>
           <a:prstGeom prst="rect">
             <a:avLst/>
           </a:prstGeom>
           <a:solidFill>
-            <a:schemeClr val="accent1">
-              <a:lumMod val="20000"/>
-              <a:lumOff val="80000"/>
+            <a:schemeClr val="bg1">
+              <a:lumMod val="85000"/>
             </a:schemeClr>
           </a:solidFill>
-          <a:ln w="15875">
-            <a:solidFill>
-              <a:schemeClr val="tx1"/>
-            </a:solidFill>
+          <a:ln>
+            <a:noFill/>
           </a:ln>
           <a:effectLst>
-            <a:outerShdw blurRad="50800" dist="50800" dir="5400000" algn="ctr" rotWithShape="0">
-              <a:schemeClr val="bg1"/>
+            <a:outerShdw blurRad="44450" dist="27940" dir="5400000" algn="ctr">
+              <a:srgbClr val="000000">
+                <a:alpha val="32000"/>
+              </a:srgbClr>
             </a:outerShdw>
           </a:effectLst>
+          <a:scene3d>
+            <a:camera prst="orthographicFront">
+              <a:rot lat="0" lon="0" rev="0"/>
+            </a:camera>
+            <a:lightRig rig="balanced" dir="t">
+              <a:rot lat="0" lon="0" rev="8700000"/>
+            </a:lightRig>
+          </a:scene3d>
+          <a:sp3d>
+            <a:bevelT w="190500" h="38100"/>
+          </a:sp3d>
         </p:spPr>
-        <p:txBody>
-          <a:bodyPr wrap="square" rtlCol="0">
-            <a:spAutoFit/>
+        <p:style>
+          <a:lnRef idx="2">
+            <a:schemeClr val="accent1">
+              <a:shade val="50000"/>
+            </a:schemeClr>
+          </a:lnRef>
+          <a:fillRef idx="1">
+            <a:schemeClr val="accent1"/>
+          </a:fillRef>
+          <a:effectRef idx="0">
+            <a:schemeClr val="accent1"/>
+          </a:effectRef>
+          <a:fontRef idx="minor">
+            <a:schemeClr val="lt1"/>
+          </a:fontRef>
+        </p:style>
+        <p:txBody>
+          <a:bodyPr rot="0" spcFirstLastPara="0" vertOverflow="overflow" horzOverflow="overflow" vert="horz" wrap="square" lIns="91440" tIns="45720" rIns="91440" bIns="45720" numCol="1" spcCol="0" rtlCol="0" fromWordArt="0" anchor="ctr" anchorCtr="0" forceAA="0" compatLnSpc="1">
+            <a:prstTxWarp prst="textNoShape">
+              <a:avLst/>
+            </a:prstTxWarp>
+            <a:noAutofit/>
           </a:bodyPr>
-          <a:lstStyle/>
-          <a:p>
-            <a:r>
-              <a:rPr lang="en-US" dirty="0" smtClean="0"/>
+          <a:lstStyle>
+            <a:defPPr>
+              <a:defRPr lang="en-US"/>
+            </a:defPPr>
+            <a:lvl1pPr algn="ctr">
+              <a:defRPr>
+                <a:solidFill>
+                  <a:schemeClr val="tx2">
+                    <a:lumMod val="60000"/>
+                    <a:lumOff val="40000"/>
+                  </a:schemeClr>
+                </a:solidFill>
+              </a:defRPr>
+            </a:lvl1pPr>
+            <a:lvl2pPr>
+              <a:defRPr>
+                <a:solidFill>
+                  <a:schemeClr val="lt1"/>
+                </a:solidFill>
+              </a:defRPr>
+            </a:lvl2pPr>
+            <a:lvl3pPr>
+              <a:defRPr>
+                <a:solidFill>
+                  <a:schemeClr val="lt1"/>
+                </a:solidFill>
+              </a:defRPr>
+            </a:lvl3pPr>
+            <a:lvl4pPr>
+              <a:defRPr>
+                <a:solidFill>
+                  <a:schemeClr val="lt1"/>
+                </a:solidFill>
+              </a:defRPr>
+            </a:lvl4pPr>
+            <a:lvl5pPr>
+              <a:defRPr>
+                <a:solidFill>
+                  <a:schemeClr val="lt1"/>
+                </a:solidFill>
+              </a:defRPr>
+            </a:lvl5pPr>
+            <a:lvl6pPr>
+              <a:defRPr>
+                <a:solidFill>
+                  <a:schemeClr val="lt1"/>
+                </a:solidFill>
+              </a:defRPr>
+            </a:lvl6pPr>
+            <a:lvl7pPr>
+              <a:defRPr>
+                <a:solidFill>
+                  <a:schemeClr val="lt1"/>
+                </a:solidFill>
+              </a:defRPr>
+            </a:lvl7pPr>
+            <a:lvl8pPr>
+              <a:defRPr>
+                <a:solidFill>
+                  <a:schemeClr val="lt1"/>
+                </a:solidFill>
+              </a:defRPr>
+            </a:lvl8pPr>
+            <a:lvl9pPr>
+              <a:defRPr>
+                <a:solidFill>
+                  <a:schemeClr val="lt1"/>
+                </a:solidFill>
+              </a:defRPr>
+            </a:lvl9pPr>
+          </a:lstStyle>
+          <a:p>
+            <a:r>
+              <a:rPr lang="en-US" dirty="0"/>
               <a:t>Save Map</a:t>
             </a:r>
             <a:endParaRPr lang="en-US" dirty="0"/>

</xml_diff>